<commit_message>
change help background and start readme
</commit_message>
<xml_diff>
--- a/resources/help.pptx
+++ b/resources/help.pptx
@@ -5,9 +5,9 @@
     <p:sldMasterId id="2147483672" r:id="rId1"/>
   </p:sldMasterIdLst>
   <p:sldIdLst>
-    <p:sldId id="256" r:id="rId2"/>
-    <p:sldId id="258" r:id="rId3"/>
-    <p:sldId id="257" r:id="rId4"/>
+    <p:sldId id="258" r:id="rId2"/>
+    <p:sldId id="259" r:id="rId3"/>
+    <p:sldId id="261" r:id="rId4"/>
   </p:sldIdLst>
   <p:sldSz cx="11430000" cy="7534275"/>
   <p:notesSz cx="6858000" cy="9144000"/>
@@ -245,7 +245,7 @@
           <a:p>
             <a:fld id="{3A251522-A650-44F9-ACF1-52980FE03090}" type="datetimeFigureOut">
               <a:rPr lang="he-IL" smtClean="0"/>
-              <a:t>ז'/סיון/תשפ"ד</a:t>
+              <a:t>כ"ז/סיון/תשפ"ד</a:t>
             </a:fld>
             <a:endParaRPr lang="he-IL"/>
           </a:p>
@@ -415,7 +415,7 @@
           <a:p>
             <a:fld id="{3A251522-A650-44F9-ACF1-52980FE03090}" type="datetimeFigureOut">
               <a:rPr lang="he-IL" smtClean="0"/>
-              <a:t>ז'/סיון/תשפ"ד</a:t>
+              <a:t>כ"ז/סיון/תשפ"ד</a:t>
             </a:fld>
             <a:endParaRPr lang="he-IL"/>
           </a:p>
@@ -595,7 +595,7 @@
           <a:p>
             <a:fld id="{3A251522-A650-44F9-ACF1-52980FE03090}" type="datetimeFigureOut">
               <a:rPr lang="he-IL" smtClean="0"/>
-              <a:t>ז'/סיון/תשפ"ד</a:t>
+              <a:t>כ"ז/סיון/תשפ"ד</a:t>
             </a:fld>
             <a:endParaRPr lang="he-IL"/>
           </a:p>
@@ -765,7 +765,7 @@
           <a:p>
             <a:fld id="{3A251522-A650-44F9-ACF1-52980FE03090}" type="datetimeFigureOut">
               <a:rPr lang="he-IL" smtClean="0"/>
-              <a:t>ז'/סיון/תשפ"ד</a:t>
+              <a:t>כ"ז/סיון/תשפ"ד</a:t>
             </a:fld>
             <a:endParaRPr lang="he-IL"/>
           </a:p>
@@ -1011,7 +1011,7 @@
           <a:p>
             <a:fld id="{3A251522-A650-44F9-ACF1-52980FE03090}" type="datetimeFigureOut">
               <a:rPr lang="he-IL" smtClean="0"/>
-              <a:t>ז'/סיון/תשפ"ד</a:t>
+              <a:t>כ"ז/סיון/תשפ"ד</a:t>
             </a:fld>
             <a:endParaRPr lang="he-IL"/>
           </a:p>
@@ -1243,7 +1243,7 @@
           <a:p>
             <a:fld id="{3A251522-A650-44F9-ACF1-52980FE03090}" type="datetimeFigureOut">
               <a:rPr lang="he-IL" smtClean="0"/>
-              <a:t>ז'/סיון/תשפ"ד</a:t>
+              <a:t>כ"ז/סיון/תשפ"ד</a:t>
             </a:fld>
             <a:endParaRPr lang="he-IL"/>
           </a:p>
@@ -1610,7 +1610,7 @@
           <a:p>
             <a:fld id="{3A251522-A650-44F9-ACF1-52980FE03090}" type="datetimeFigureOut">
               <a:rPr lang="he-IL" smtClean="0"/>
-              <a:t>ז'/סיון/תשפ"ד</a:t>
+              <a:t>כ"ז/סיון/תשפ"ד</a:t>
             </a:fld>
             <a:endParaRPr lang="he-IL"/>
           </a:p>
@@ -1728,7 +1728,7 @@
           <a:p>
             <a:fld id="{3A251522-A650-44F9-ACF1-52980FE03090}" type="datetimeFigureOut">
               <a:rPr lang="he-IL" smtClean="0"/>
-              <a:t>ז'/סיון/תשפ"ד</a:t>
+              <a:t>כ"ז/סיון/תשפ"ד</a:t>
             </a:fld>
             <a:endParaRPr lang="he-IL"/>
           </a:p>
@@ -1823,7 +1823,7 @@
           <a:p>
             <a:fld id="{3A251522-A650-44F9-ACF1-52980FE03090}" type="datetimeFigureOut">
               <a:rPr lang="he-IL" smtClean="0"/>
-              <a:t>ז'/סיון/תשפ"ד</a:t>
+              <a:t>כ"ז/סיון/תשפ"ד</a:t>
             </a:fld>
             <a:endParaRPr lang="he-IL"/>
           </a:p>
@@ -2100,7 +2100,7 @@
           <a:p>
             <a:fld id="{3A251522-A650-44F9-ACF1-52980FE03090}" type="datetimeFigureOut">
               <a:rPr lang="he-IL" smtClean="0"/>
-              <a:t>ז'/סיון/תשפ"ד</a:t>
+              <a:t>כ"ז/סיון/תשפ"ד</a:t>
             </a:fld>
             <a:endParaRPr lang="he-IL"/>
           </a:p>
@@ -2357,7 +2357,7 @@
           <a:p>
             <a:fld id="{3A251522-A650-44F9-ACF1-52980FE03090}" type="datetimeFigureOut">
               <a:rPr lang="he-IL" smtClean="0"/>
-              <a:t>ז'/סיון/תשפ"ד</a:t>
+              <a:t>כ"ז/סיון/תשפ"ד</a:t>
             </a:fld>
             <a:endParaRPr lang="he-IL"/>
           </a:p>
@@ -2422,9 +2422,18 @@
 <p:sldMaster xmlns:a="http://schemas.openxmlformats.org/drawingml/2006/main" xmlns:r="http://schemas.openxmlformats.org/officeDocument/2006/relationships" xmlns:p="http://schemas.openxmlformats.org/presentationml/2006/main">
   <p:cSld>
     <p:bg>
-      <p:bgRef idx="1001">
-        <a:schemeClr val="bg1"/>
-      </p:bgRef>
+      <p:bgPr>
+        <a:blipFill dpi="0" rotWithShape="1">
+          <a:blip r:embed="rId13">
+            <a:lum/>
+          </a:blip>
+          <a:srcRect/>
+          <a:stretch>
+            <a:fillRect/>
+          </a:stretch>
+        </a:blipFill>
+        <a:effectLst/>
+      </p:bgPr>
     </p:bg>
     <p:spTree>
       <p:nvGrpSpPr>
@@ -2570,7 +2579,7 @@
           <a:p>
             <a:fld id="{3A251522-A650-44F9-ACF1-52980FE03090}" type="datetimeFigureOut">
               <a:rPr lang="he-IL" smtClean="0"/>
-              <a:t>ז'/סיון/תשפ"ד</a:t>
+              <a:t>כ"ז/סיון/תשפ"ד</a:t>
             </a:fld>
             <a:endParaRPr lang="he-IL"/>
           </a:p>
@@ -2961,20 +2970,6 @@
 <file path=ppt/slides/slide1.xml><?xml version="1.0" encoding="utf-8"?>
 <p:sld xmlns:a="http://schemas.openxmlformats.org/drawingml/2006/main" xmlns:r="http://schemas.openxmlformats.org/officeDocument/2006/relationships" xmlns:p="http://schemas.openxmlformats.org/presentationml/2006/main">
   <p:cSld>
-    <p:bg>
-      <p:bgPr>
-        <a:blipFill dpi="0" rotWithShape="1">
-          <a:blip r:embed="rId2">
-            <a:lum/>
-          </a:blip>
-          <a:srcRect/>
-          <a:stretch>
-            <a:fillRect/>
-          </a:stretch>
-        </a:blipFill>
-        <a:effectLst/>
-      </p:bgPr>
-    </p:bg>
     <p:spTree>
       <p:nvGrpSpPr>
         <p:cNvPr id="1" name=""/>
@@ -3003,8 +2998,8 @@
         </p:nvSpPr>
         <p:spPr>
           <a:xfrm>
-            <a:off x="558209" y="1758895"/>
-            <a:ext cx="10313582" cy="4016484"/>
+            <a:off x="558209" y="1912783"/>
+            <a:ext cx="10313582" cy="3708708"/>
           </a:xfrm>
           <a:prstGeom prst="rect">
             <a:avLst/>
@@ -3028,7 +3023,7 @@
                   <a:srgbClr val="FFFFFF"/>
                 </a:solidFill>
                 <a:effectLst/>
-                <a:latin typeface="ADLaM Display" panose="020F0502020204030204" pitchFamily="2" charset="0"/>
+                <a:latin typeface="New Athletic M54" panose="02000500000000000000" pitchFamily="2" charset="0"/>
                 <a:ea typeface="ADLaM Display" panose="020F0502020204030204" pitchFamily="2" charset="0"/>
                 <a:cs typeface="ADLaM Display" panose="020F0502020204030204" pitchFamily="2" charset="0"/>
               </a:rPr>
@@ -3039,7 +3034,7 @@
                 <a:solidFill>
                   <a:srgbClr val="FFFFFF"/>
                 </a:solidFill>
-                <a:latin typeface="ADLaM Display" panose="020F0502020204030204" pitchFamily="2" charset="0"/>
+                <a:latin typeface="New Athletic M54" panose="02000500000000000000" pitchFamily="2" charset="0"/>
                 <a:ea typeface="ADLaM Display" panose="020F0502020204030204" pitchFamily="2" charset="0"/>
                 <a:cs typeface="ADLaM Display" panose="020F0502020204030204" pitchFamily="2" charset="0"/>
               </a:rPr>
@@ -3051,11 +3046,11 @@
                   <a:srgbClr val="FFFFFF"/>
                 </a:solidFill>
                 <a:effectLst/>
-                <a:latin typeface="ADLaM Display" panose="020F0502020204030204" pitchFamily="2" charset="0"/>
+                <a:latin typeface="New Athletic M54" panose="02000500000000000000" pitchFamily="2" charset="0"/>
                 <a:ea typeface="ADLaM Display" panose="020F0502020204030204" pitchFamily="2" charset="0"/>
                 <a:cs typeface="ADLaM Display" panose="020F0502020204030204" pitchFamily="2" charset="0"/>
               </a:rPr>
-              <a:t> and avoid deadly obstacles. Keep going for as long as you can and pick up power-ups along the way!</a:t>
+              <a:t> and avoid deadly obstacles. Keep going for as long as you can and pick up power-ups along the way.!</a:t>
             </a:r>
           </a:p>
           <a:p>
@@ -3068,7 +3063,7 @@
               <a:solidFill>
                 <a:srgbClr val="FFFFFF"/>
               </a:solidFill>
-              <a:latin typeface="ADLaM Display" panose="020F0502020204030204" pitchFamily="2" charset="0"/>
+              <a:latin typeface="New Athletic M54" panose="02000500000000000000" pitchFamily="2" charset="0"/>
               <a:ea typeface="ADLaM Display" panose="020F0502020204030204" pitchFamily="2" charset="0"/>
               <a:cs typeface="ADLaM Display" panose="020F0502020204030204" pitchFamily="2" charset="0"/>
             </a:endParaRPr>
@@ -3085,7 +3080,7 @@
                   <a:srgbClr val="FFFFFF"/>
                 </a:solidFill>
                 <a:effectLst/>
-                <a:latin typeface="ADLaM Display" panose="020F0502020204030204" pitchFamily="2" charset="0"/>
+                <a:latin typeface="New Athletic M54" panose="02000500000000000000" pitchFamily="2" charset="0"/>
                 <a:ea typeface="ADLaM Display" panose="020F0502020204030204" pitchFamily="2" charset="0"/>
                 <a:cs typeface="ADLaM Display" panose="020F0502020204030204" pitchFamily="2" charset="0"/>
               </a:rPr>
@@ -3103,7 +3098,7 @@
                 <a:solidFill>
                   <a:srgbClr val="FFFFFF"/>
                 </a:solidFill>
-                <a:latin typeface="ADLaM Display" panose="020F0502020204030204" pitchFamily="2" charset="0"/>
+                <a:latin typeface="New Athletic M54" panose="02000500000000000000" pitchFamily="2" charset="0"/>
                 <a:ea typeface="ADLaM Display" panose="020F0502020204030204" pitchFamily="2" charset="0"/>
                 <a:cs typeface="ADLaM Display" panose="020F0502020204030204" pitchFamily="2" charset="0"/>
               </a:rPr>
@@ -3115,7 +3110,7 @@
                   <a:srgbClr val="FFFFFF"/>
                 </a:solidFill>
                 <a:effectLst/>
-                <a:latin typeface="ADLaM Display" panose="020F0502020204030204" pitchFamily="2" charset="0"/>
+                <a:latin typeface="New Athletic M54" panose="02000500000000000000" pitchFamily="2" charset="0"/>
                 <a:ea typeface="ADLaM Display" panose="020F0502020204030204" pitchFamily="2" charset="0"/>
                 <a:cs typeface="ADLaM Display" panose="020F0502020204030204" pitchFamily="2" charset="0"/>
               </a:rPr>
@@ -3133,7 +3128,7 @@
                 <a:srgbClr val="FFFFFF"/>
               </a:solidFill>
               <a:effectLst/>
-              <a:latin typeface="ADLaM Display" panose="020F0502020204030204" pitchFamily="2" charset="0"/>
+              <a:latin typeface="New Athletic M54" panose="02000500000000000000" pitchFamily="2" charset="0"/>
               <a:ea typeface="ADLaM Display" panose="020F0502020204030204" pitchFamily="2" charset="0"/>
               <a:cs typeface="ADLaM Display" panose="020F0502020204030204" pitchFamily="2" charset="0"/>
             </a:endParaRPr>
@@ -3150,7 +3145,7 @@
                   <a:srgbClr val="FFFFFF"/>
                 </a:solidFill>
                 <a:effectLst/>
-                <a:latin typeface="ADLaM Display" panose="020F0502020204030204" pitchFamily="2" charset="0"/>
+                <a:latin typeface="New Athletic M54" panose="02000500000000000000" pitchFamily="2" charset="0"/>
                 <a:ea typeface="ADLaM Display" panose="020F0502020204030204" pitchFamily="2" charset="0"/>
                 <a:cs typeface="ADLaM Display" panose="020F0502020204030204" pitchFamily="2" charset="0"/>
               </a:rPr>
@@ -3171,7 +3166,7 @@
                   <a:srgbClr val="FFFFFF"/>
                 </a:solidFill>
                 <a:effectLst/>
-                <a:latin typeface="ADLaM Display" panose="020F0502020204030204" pitchFamily="2" charset="0"/>
+                <a:latin typeface="New Athletic M54" panose="02000500000000000000" pitchFamily="2" charset="0"/>
                 <a:ea typeface="ADLaM Display" panose="020F0502020204030204" pitchFamily="2" charset="0"/>
                 <a:cs typeface="ADLaM Display" panose="020F0502020204030204" pitchFamily="2" charset="0"/>
               </a:rPr>
@@ -3192,7 +3187,7 @@
                   <a:srgbClr val="FFFFFF"/>
                 </a:solidFill>
                 <a:effectLst/>
-                <a:latin typeface="ADLaM Display" panose="020F0502020204030204" pitchFamily="2" charset="0"/>
+                <a:latin typeface="New Athletic M54" panose="02000500000000000000" pitchFamily="2" charset="0"/>
                 <a:ea typeface="ADLaM Display" panose="020F0502020204030204" pitchFamily="2" charset="0"/>
                 <a:cs typeface="ADLaM Display" panose="020F0502020204030204" pitchFamily="2" charset="0"/>
               </a:rPr>
@@ -3201,60 +3196,46 @@
           </a:p>
         </p:txBody>
       </p:sp>
-      <p:sp>
-        <p:nvSpPr>
-          <p:cNvPr id="9" name="תיבת טקסט 8">
+      <p:pic>
+        <p:nvPicPr>
+          <p:cNvPr id="4" name="תמונה 3" descr="תמונה שמכילה צעצוע, אנימציה, דמות בדיונית, סרטים מצוירים&#10;&#10;התיאור נוצר באופן אוטומטי">
             <a:extLst>
               <a:ext uri="{FF2B5EF4-FFF2-40B4-BE49-F238E27FC236}">
-                <a16:creationId xmlns:a16="http://schemas.microsoft.com/office/drawing/2014/main" id="{2C37AC61-EFA4-A946-EE04-21580D318D7A}"/>
+                <a16:creationId xmlns:a16="http://schemas.microsoft.com/office/drawing/2014/main" id="{90347A58-97C4-09FD-0479-D8BEBE4C7DD8}"/>
               </a:ext>
             </a:extLst>
           </p:cNvPr>
-          <p:cNvSpPr txBox="1"/>
+          <p:cNvPicPr>
+            <a:picLocks noChangeAspect="1"/>
+          </p:cNvPicPr>
           <p:nvPr/>
-        </p:nvSpPr>
+        </p:nvPicPr>
+        <p:blipFill>
+          <a:blip r:embed="rId2">
+            <a:extLst>
+              <a:ext uri="{28A0092B-C50C-407E-A947-70E740481C1C}">
+                <a14:useLocalDpi xmlns:a14="http://schemas.microsoft.com/office/drawing/2010/main" val="0"/>
+              </a:ext>
+            </a:extLst>
+          </a:blip>
+          <a:stretch>
+            <a:fillRect/>
+          </a:stretch>
+        </p:blipFill>
         <p:spPr>
           <a:xfrm>
-            <a:off x="1" y="0"/>
-            <a:ext cx="11429999" cy="400110"/>
+            <a:off x="7433613" y="4328401"/>
+            <a:ext cx="2895795" cy="2895795"/>
           </a:xfrm>
           <a:prstGeom prst="rect">
             <a:avLst/>
           </a:prstGeom>
-          <a:noFill/>
-        </p:spPr>
-        <p:txBody>
-          <a:bodyPr wrap="square" rtlCol="1">
-            <a:spAutoFit/>
-          </a:bodyPr>
-          <a:lstStyle/>
-          <a:p>
-            <a:pPr algn="ctr"/>
-            <a:r>
-              <a:rPr lang="en-US" sz="2000" dirty="0">
-                <a:solidFill>
-                  <a:srgbClr val="FFFFFF"/>
-                </a:solidFill>
-                <a:latin typeface="ADLaM Display" panose="020F0502020204030204" pitchFamily="2" charset="0"/>
-                <a:ea typeface="ADLaM Display" panose="020F0502020204030204" pitchFamily="2" charset="0"/>
-                <a:cs typeface="ADLaM Display" panose="020F0502020204030204" pitchFamily="2" charset="0"/>
-              </a:rPr>
-              <a:t>-click anywhere on the window to return to the game menu-</a:t>
-            </a:r>
-            <a:endParaRPr lang="he-IL" sz="2000" dirty="0">
-              <a:solidFill>
-                <a:srgbClr val="FFFFFF"/>
-              </a:solidFill>
-              <a:latin typeface="ADLaM Display" panose="020F0502020204030204" pitchFamily="2" charset="0"/>
-              <a:ea typeface="ADLaM Display" panose="020F0502020204030204" pitchFamily="2" charset="0"/>
-            </a:endParaRPr>
-          </a:p>
-        </p:txBody>
-      </p:sp>
+        </p:spPr>
+      </p:pic>
     </p:spTree>
     <p:extLst>
       <p:ext uri="{BB962C8B-B14F-4D97-AF65-F5344CB8AC3E}">
-        <p14:creationId xmlns:p14="http://schemas.microsoft.com/office/powerpoint/2010/main" val="3362737707"/>
+        <p14:creationId xmlns:p14="http://schemas.microsoft.com/office/powerpoint/2010/main" val="1509150701"/>
       </p:ext>
     </p:extLst>
   </p:cSld>
@@ -3267,20 +3248,6 @@
 <file path=ppt/slides/slide2.xml><?xml version="1.0" encoding="utf-8"?>
 <p:sld xmlns:a="http://schemas.openxmlformats.org/drawingml/2006/main" xmlns:r="http://schemas.openxmlformats.org/officeDocument/2006/relationships" xmlns:p="http://schemas.openxmlformats.org/presentationml/2006/main">
   <p:cSld>
-    <p:bg>
-      <p:bgPr>
-        <a:blipFill dpi="0" rotWithShape="1">
-          <a:blip r:embed="rId2">
-            <a:lum/>
-          </a:blip>
-          <a:srcRect/>
-          <a:stretch>
-            <a:fillRect/>
-          </a:stretch>
-        </a:blipFill>
-        <a:effectLst/>
-      </p:bgPr>
-    </p:bg>
     <p:spTree>
       <p:nvGrpSpPr>
         <p:cNvPr id="1" name=""/>
@@ -3297,10 +3264,92 @@
       </p:grpSpPr>
       <p:sp>
         <p:nvSpPr>
-          <p:cNvPr id="6" name="תיבת טקסט 5">
+          <p:cNvPr id="2" name="כותרת 1">
             <a:extLst>
               <a:ext uri="{FF2B5EF4-FFF2-40B4-BE49-F238E27FC236}">
-                <a16:creationId xmlns:a16="http://schemas.microsoft.com/office/drawing/2014/main" id="{573861F5-474C-075D-F6CF-C5F7243B2F2E}"/>
+                <a16:creationId xmlns:a16="http://schemas.microsoft.com/office/drawing/2014/main" id="{AC78D81A-B70D-BF3F-A66F-EDAFF6C1BC5E}"/>
+              </a:ext>
+            </a:extLst>
+          </p:cNvPr>
+          <p:cNvSpPr>
+            <a:spLocks noGrp="1"/>
+          </p:cNvSpPr>
+          <p:nvPr>
+            <p:ph type="title"/>
+          </p:nvPr>
+        </p:nvSpPr>
+        <p:spPr>
+          <a:xfrm>
+            <a:off x="785812" y="566517"/>
+            <a:ext cx="9858375" cy="981089"/>
+          </a:xfrm>
+        </p:spPr>
+        <p:txBody>
+          <a:bodyPr>
+            <a:normAutofit/>
+          </a:bodyPr>
+          <a:lstStyle/>
+          <a:p>
+            <a:pPr algn="ctr"/>
+            <a:r>
+              <a:rPr lang="en-US" sz="4000" dirty="0">
+                <a:solidFill>
+                  <a:schemeClr val="bg1"/>
+                </a:solidFill>
+                <a:latin typeface="New Athletic M54" panose="02000500000000000000" pitchFamily="2" charset="0"/>
+              </a:rPr>
+              <a:t>elements</a:t>
+            </a:r>
+            <a:endParaRPr lang="he-IL" sz="4000" dirty="0">
+              <a:solidFill>
+                <a:schemeClr val="bg1"/>
+              </a:solidFill>
+              <a:latin typeface="New Athletic M54" panose="02000500000000000000" pitchFamily="2" charset="0"/>
+            </a:endParaRPr>
+          </a:p>
+        </p:txBody>
+      </p:sp>
+      <p:pic>
+        <p:nvPicPr>
+          <p:cNvPr id="9" name="מציין מיקום תוכן 8" descr="תמונה שמכילה פרח&#10;&#10;התיאור נוצר באופן אוטומטי">
+            <a:extLst>
+              <a:ext uri="{FF2B5EF4-FFF2-40B4-BE49-F238E27FC236}">
+                <a16:creationId xmlns:a16="http://schemas.microsoft.com/office/drawing/2014/main" id="{0297D298-4FCF-8236-BC73-EAFAB939F5A6}"/>
+              </a:ext>
+            </a:extLst>
+          </p:cNvPr>
+          <p:cNvPicPr>
+            <a:picLocks noGrp="1" noChangeAspect="1"/>
+          </p:cNvPicPr>
+          <p:nvPr>
+            <p:ph idx="1"/>
+          </p:nvPr>
+        </p:nvPicPr>
+        <p:blipFill>
+          <a:blip r:embed="rId2">
+            <a:extLst>
+              <a:ext uri="{28A0092B-C50C-407E-A947-70E740481C1C}">
+                <a14:useLocalDpi xmlns:a14="http://schemas.microsoft.com/office/drawing/2010/main" val="0"/>
+              </a:ext>
+            </a:extLst>
+          </a:blip>
+          <a:stretch>
+            <a:fillRect/>
+          </a:stretch>
+        </p:blipFill>
+        <p:spPr>
+          <a:xfrm>
+            <a:off x="882057" y="1486871"/>
+            <a:ext cx="685350" cy="699057"/>
+          </a:xfrm>
+        </p:spPr>
+      </p:pic>
+      <p:sp>
+        <p:nvSpPr>
+          <p:cNvPr id="10" name="תיבת טקסט 9">
+            <a:extLst>
+              <a:ext uri="{FF2B5EF4-FFF2-40B4-BE49-F238E27FC236}">
+                <a16:creationId xmlns:a16="http://schemas.microsoft.com/office/drawing/2014/main" id="{B0CE6DB8-CC68-1B96-2856-25746751ABAF}"/>
               </a:ext>
             </a:extLst>
           </p:cNvPr>
@@ -3309,210 +3358,82 @@
         </p:nvSpPr>
         <p:spPr>
           <a:xfrm>
-            <a:off x="558209" y="1912783"/>
-            <a:ext cx="10313582" cy="3708708"/>
+            <a:off x="1666261" y="1478042"/>
+            <a:ext cx="8977926" cy="707886"/>
           </a:xfrm>
           <a:prstGeom prst="rect">
             <a:avLst/>
           </a:prstGeom>
           <a:noFill/>
-        </p:spPr>
-        <p:txBody>
-          <a:bodyPr wrap="square" rtlCol="1" anchor="ctr">
+          <a:ln>
+            <a:noFill/>
+          </a:ln>
+        </p:spPr>
+        <p:txBody>
+          <a:bodyPr wrap="square" rtlCol="1">
             <a:spAutoFit/>
           </a:bodyPr>
           <a:lstStyle/>
           <a:p>
-            <a:pPr algn="just">
-              <a:spcAft>
-                <a:spcPts val="600"/>
-              </a:spcAft>
-            </a:pPr>
-            <a:r>
-              <a:rPr lang="en-US" sz="2000" i="0" dirty="0">
-                <a:solidFill>
-                  <a:srgbClr val="FFFFFF"/>
-                </a:solidFill>
-                <a:effectLst/>
-                <a:latin typeface="New Athletic M54" panose="02000500000000000000" pitchFamily="2" charset="0"/>
-                <a:ea typeface="ADLaM Display" panose="020F0502020204030204" pitchFamily="2" charset="0"/>
-                <a:cs typeface="ADLaM Display" panose="020F0502020204030204" pitchFamily="2" charset="0"/>
-              </a:rPr>
-              <a:t>Jetpack Joyride is an endless runner where you fly a jetpack. </a:t>
-            </a:r>
             <a:r>
               <a:rPr lang="en-US" sz="2000" dirty="0">
                 <a:solidFill>
-                  <a:srgbClr val="FFFFFF"/>
+                  <a:schemeClr val="bg1"/>
                 </a:solidFill>
                 <a:latin typeface="New Athletic M54" panose="02000500000000000000" pitchFamily="2" charset="0"/>
-                <a:ea typeface="ADLaM Display" panose="020F0502020204030204" pitchFamily="2" charset="0"/>
-                <a:cs typeface="ADLaM Display" panose="020F0502020204030204" pitchFamily="2" charset="0"/>
               </a:rPr>
-              <a:t>Collect Coins</a:t>
-            </a:r>
-            <a:r>
-              <a:rPr lang="en-US" sz="2000" i="0" dirty="0">
-                <a:solidFill>
-                  <a:srgbClr val="FFFFFF"/>
-                </a:solidFill>
-                <a:effectLst/>
-                <a:latin typeface="New Athletic M54" panose="02000500000000000000" pitchFamily="2" charset="0"/>
-                <a:ea typeface="ADLaM Display" panose="020F0502020204030204" pitchFamily="2" charset="0"/>
-                <a:cs typeface="ADLaM Display" panose="020F0502020204030204" pitchFamily="2" charset="0"/>
-              </a:rPr>
-              <a:t> and avoid deadly obstacles. Keep going for as long as you can and pick up power-ups along the way!</a:t>
-            </a:r>
-          </a:p>
-          <a:p>
-            <a:pPr algn="just">
-              <a:spcAft>
-                <a:spcPts val="600"/>
-              </a:spcAft>
-            </a:pPr>
-            <a:endParaRPr lang="en-US" sz="2000" dirty="0">
+              <a:t>Taking the power up gift will randomly allow the player to change gravity	 or to become a tank  		  with the ability to be hit once.</a:t>
+            </a:r>
+            <a:endParaRPr lang="he-IL" sz="2000" dirty="0">
               <a:solidFill>
-                <a:srgbClr val="FFFFFF"/>
+                <a:schemeClr val="bg1"/>
               </a:solidFill>
               <a:latin typeface="New Athletic M54" panose="02000500000000000000" pitchFamily="2" charset="0"/>
-              <a:ea typeface="ADLaM Display" panose="020F0502020204030204" pitchFamily="2" charset="0"/>
-              <a:cs typeface="ADLaM Display" panose="020F0502020204030204" pitchFamily="2" charset="0"/>
             </a:endParaRPr>
           </a:p>
-          <a:p>
-            <a:pPr algn="just">
-              <a:spcAft>
-                <a:spcPts val="600"/>
-              </a:spcAft>
-            </a:pPr>
-            <a:r>
-              <a:rPr lang="en-US" sz="2000" i="0" dirty="0">
-                <a:solidFill>
-                  <a:srgbClr val="FFFFFF"/>
-                </a:solidFill>
-                <a:effectLst/>
-                <a:latin typeface="New Athletic M54" panose="02000500000000000000" pitchFamily="2" charset="0"/>
-                <a:ea typeface="ADLaM Display" panose="020F0502020204030204" pitchFamily="2" charset="0"/>
-                <a:cs typeface="ADLaM Display" panose="020F0502020204030204" pitchFamily="2" charset="0"/>
-              </a:rPr>
-              <a:t>You can fly using the space button, collect different styles with different features.</a:t>
-            </a:r>
-          </a:p>
-          <a:p>
-            <a:pPr algn="just">
-              <a:spcAft>
-                <a:spcPts val="600"/>
-              </a:spcAft>
-            </a:pPr>
-            <a:r>
-              <a:rPr lang="en-US" sz="2000" dirty="0">
-                <a:solidFill>
-                  <a:srgbClr val="FFFFFF"/>
-                </a:solidFill>
-                <a:latin typeface="New Athletic M54" panose="02000500000000000000" pitchFamily="2" charset="0"/>
-                <a:ea typeface="ADLaM Display" panose="020F0502020204030204" pitchFamily="2" charset="0"/>
-                <a:cs typeface="ADLaM Display" panose="020F0502020204030204" pitchFamily="2" charset="0"/>
-              </a:rPr>
-              <a:t>If you hit an </a:t>
-            </a:r>
-            <a:r>
-              <a:rPr lang="en-US" sz="2000" i="0" dirty="0">
-                <a:solidFill>
-                  <a:srgbClr val="FFFFFF"/>
-                </a:solidFill>
-                <a:effectLst/>
-                <a:latin typeface="New Athletic M54" panose="02000500000000000000" pitchFamily="2" charset="0"/>
-                <a:ea typeface="ADLaM Display" panose="020F0502020204030204" pitchFamily="2" charset="0"/>
-                <a:cs typeface="ADLaM Display" panose="020F0502020204030204" pitchFamily="2" charset="0"/>
-              </a:rPr>
-              <a:t>obstacle you will return to the original skin, if you already using the first character you will lose the game.</a:t>
-            </a:r>
-          </a:p>
-          <a:p>
-            <a:pPr algn="just">
-              <a:spcAft>
-                <a:spcPts val="600"/>
-              </a:spcAft>
-            </a:pPr>
-            <a:endParaRPr lang="en-US" sz="2000" i="0" dirty="0">
-              <a:solidFill>
-                <a:srgbClr val="FFFFFF"/>
-              </a:solidFill>
-              <a:effectLst/>
-              <a:latin typeface="New Athletic M54" panose="02000500000000000000" pitchFamily="2" charset="0"/>
-              <a:ea typeface="ADLaM Display" panose="020F0502020204030204" pitchFamily="2" charset="0"/>
-              <a:cs typeface="ADLaM Display" panose="020F0502020204030204" pitchFamily="2" charset="0"/>
-            </a:endParaRPr>
-          </a:p>
-          <a:p>
-            <a:pPr algn="just">
-              <a:spcAft>
-                <a:spcPts val="600"/>
-              </a:spcAft>
-            </a:pPr>
-            <a:r>
-              <a:rPr lang="en-US" sz="2000" i="0" dirty="0">
-                <a:solidFill>
-                  <a:srgbClr val="FFFFFF"/>
-                </a:solidFill>
-                <a:effectLst/>
-                <a:latin typeface="New Athletic M54" panose="02000500000000000000" pitchFamily="2" charset="0"/>
-                <a:ea typeface="ADLaM Display" panose="020F0502020204030204" pitchFamily="2" charset="0"/>
-                <a:cs typeface="ADLaM Display" panose="020F0502020204030204" pitchFamily="2" charset="0"/>
-              </a:rPr>
-              <a:t>Game Tips:</a:t>
-            </a:r>
-          </a:p>
-          <a:p>
-            <a:pPr marL="342900" indent="-342900" algn="just">
-              <a:spcAft>
-                <a:spcPts val="600"/>
-              </a:spcAft>
-              <a:buFont typeface="Arial" panose="020B0604020202020204" pitchFamily="34" charset="0"/>
-              <a:buChar char="•"/>
-            </a:pPr>
-            <a:r>
-              <a:rPr lang="en-US" sz="2000" i="0" dirty="0">
-                <a:solidFill>
-                  <a:srgbClr val="FFFFFF"/>
-                </a:solidFill>
-                <a:effectLst/>
-                <a:latin typeface="New Athletic M54" panose="02000500000000000000" pitchFamily="2" charset="0"/>
-                <a:ea typeface="ADLaM Display" panose="020F0502020204030204" pitchFamily="2" charset="0"/>
-                <a:cs typeface="ADLaM Display" panose="020F0502020204030204" pitchFamily="2" charset="0"/>
-              </a:rPr>
-              <a:t>Wait for the missiles to lock on before moving</a:t>
-            </a:r>
-          </a:p>
-          <a:p>
-            <a:pPr marL="342900" indent="-342900" algn="just">
-              <a:spcAft>
-                <a:spcPts val="600"/>
-              </a:spcAft>
-              <a:buFont typeface="Arial" panose="020B0604020202020204" pitchFamily="34" charset="0"/>
-              <a:buChar char="•"/>
-            </a:pPr>
-            <a:r>
-              <a:rPr lang="en-US" sz="2000" i="0" dirty="0">
-                <a:solidFill>
-                  <a:srgbClr val="FFFFFF"/>
-                </a:solidFill>
-                <a:effectLst/>
-                <a:latin typeface="New Athletic M54" panose="02000500000000000000" pitchFamily="2" charset="0"/>
-                <a:ea typeface="ADLaM Display" panose="020F0502020204030204" pitchFamily="2" charset="0"/>
-                <a:cs typeface="ADLaM Display" panose="020F0502020204030204" pitchFamily="2" charset="0"/>
-              </a:rPr>
-              <a:t>The ceiling and floor are the safest places to run</a:t>
-            </a:r>
-          </a:p>
-        </p:txBody>
-      </p:sp>
-      <p:sp>
-        <p:nvSpPr>
-          <p:cNvPr id="9" name="תיבת טקסט 8">
+        </p:txBody>
+      </p:sp>
+      <p:pic>
+        <p:nvPicPr>
+          <p:cNvPr id="12" name="תמונה 11">
             <a:extLst>
               <a:ext uri="{FF2B5EF4-FFF2-40B4-BE49-F238E27FC236}">
-                <a16:creationId xmlns:a16="http://schemas.microsoft.com/office/drawing/2014/main" id="{2C37AC61-EFA4-A946-EE04-21580D318D7A}"/>
+                <a16:creationId xmlns:a16="http://schemas.microsoft.com/office/drawing/2014/main" id="{915B2F30-86CA-C487-8F53-F80C0F1BC36F}"/>
+              </a:ext>
+            </a:extLst>
+          </p:cNvPr>
+          <p:cNvPicPr>
+            <a:picLocks noChangeAspect="1"/>
+          </p:cNvPicPr>
+          <p:nvPr/>
+        </p:nvPicPr>
+        <p:blipFill rotWithShape="1">
+          <a:blip r:embed="rId3">
+            <a:extLst>
+              <a:ext uri="{28A0092B-C50C-407E-A947-70E740481C1C}">
+                <a14:useLocalDpi xmlns:a14="http://schemas.microsoft.com/office/drawing/2010/main" val="0"/>
+              </a:ext>
+            </a:extLst>
+          </a:blip>
+          <a:srcRect l="1" r="87071"/>
+          <a:stretch/>
+        </p:blipFill>
+        <p:spPr>
+          <a:xfrm>
+            <a:off x="939280" y="2572083"/>
+            <a:ext cx="570904" cy="557181"/>
+          </a:xfrm>
+          <a:prstGeom prst="rect">
+            <a:avLst/>
+          </a:prstGeom>
+        </p:spPr>
+      </p:pic>
+      <p:sp>
+        <p:nvSpPr>
+          <p:cNvPr id="13" name="תיבת טקסט 12">
+            <a:extLst>
+              <a:ext uri="{FF2B5EF4-FFF2-40B4-BE49-F238E27FC236}">
+                <a16:creationId xmlns:a16="http://schemas.microsoft.com/office/drawing/2014/main" id="{B5D94855-2F27-45A8-FCF8-A3809229D5C2}"/>
               </a:ext>
             </a:extLst>
           </p:cNvPr>
@@ -3521,8 +3442,8 @@
         </p:nvSpPr>
         <p:spPr>
           <a:xfrm>
-            <a:off x="1" y="0"/>
-            <a:ext cx="11429999" cy="400110"/>
+            <a:off x="1756610" y="2646614"/>
+            <a:ext cx="7652084" cy="400110"/>
           </a:xfrm>
           <a:prstGeom prst="rect">
             <a:avLst/>
@@ -3535,32 +3456,298 @@
           </a:bodyPr>
           <a:lstStyle/>
           <a:p>
-            <a:pPr algn="ctr"/>
             <a:r>
               <a:rPr lang="en-US" sz="2000" dirty="0">
                 <a:solidFill>
-                  <a:srgbClr val="FFFFFF"/>
+                  <a:schemeClr val="bg1"/>
                 </a:solidFill>
                 <a:latin typeface="New Athletic M54" panose="02000500000000000000" pitchFamily="2" charset="0"/>
-                <a:ea typeface="ADLaM Display" panose="020F0502020204030204" pitchFamily="2" charset="0"/>
-                <a:cs typeface="ADLaM Display" panose="020F0502020204030204" pitchFamily="2" charset="0"/>
               </a:rPr>
-              <a:t>click anywhere on the window to return to the game menu-</a:t>
+              <a:t>You must collect as many coins as possible.</a:t>
             </a:r>
             <a:endParaRPr lang="he-IL" sz="2000" dirty="0">
               <a:solidFill>
-                <a:srgbClr val="FFFFFF"/>
+                <a:schemeClr val="bg1"/>
               </a:solidFill>
               <a:latin typeface="New Athletic M54" panose="02000500000000000000" pitchFamily="2" charset="0"/>
-              <a:ea typeface="ADLaM Display" panose="020F0502020204030204" pitchFamily="2" charset="0"/>
             </a:endParaRPr>
           </a:p>
         </p:txBody>
       </p:sp>
+      <p:pic>
+        <p:nvPicPr>
+          <p:cNvPr id="15" name="תמונה 14">
+            <a:extLst>
+              <a:ext uri="{FF2B5EF4-FFF2-40B4-BE49-F238E27FC236}">
+                <a16:creationId xmlns:a16="http://schemas.microsoft.com/office/drawing/2014/main" id="{F973D907-4A2B-A61F-4B7E-7EC22E0DA515}"/>
+              </a:ext>
+            </a:extLst>
+          </p:cNvPr>
+          <p:cNvPicPr>
+            <a:picLocks noChangeAspect="1"/>
+          </p:cNvPicPr>
+          <p:nvPr/>
+        </p:nvPicPr>
+        <p:blipFill>
+          <a:blip r:embed="rId4">
+            <a:extLst>
+              <a:ext uri="{28A0092B-C50C-407E-A947-70E740481C1C}">
+                <a14:useLocalDpi xmlns:a14="http://schemas.microsoft.com/office/drawing/2010/main" val="0"/>
+              </a:ext>
+            </a:extLst>
+          </a:blip>
+          <a:stretch>
+            <a:fillRect/>
+          </a:stretch>
+        </p:blipFill>
+        <p:spPr>
+          <a:xfrm>
+            <a:off x="805705" y="3365543"/>
+            <a:ext cx="860556" cy="783106"/>
+          </a:xfrm>
+          <a:prstGeom prst="rect">
+            <a:avLst/>
+          </a:prstGeom>
+        </p:spPr>
+      </p:pic>
+      <p:sp>
+        <p:nvSpPr>
+          <p:cNvPr id="16" name="תיבת טקסט 15">
+            <a:extLst>
+              <a:ext uri="{FF2B5EF4-FFF2-40B4-BE49-F238E27FC236}">
+                <a16:creationId xmlns:a16="http://schemas.microsoft.com/office/drawing/2014/main" id="{34735552-8F24-DC38-E582-D491C5338890}"/>
+              </a:ext>
+            </a:extLst>
+          </p:cNvPr>
+          <p:cNvSpPr txBox="1"/>
+          <p:nvPr/>
+        </p:nvSpPr>
+        <p:spPr>
+          <a:xfrm>
+            <a:off x="1756610" y="3557041"/>
+            <a:ext cx="7652084" cy="400110"/>
+          </a:xfrm>
+          <a:prstGeom prst="rect">
+            <a:avLst/>
+          </a:prstGeom>
+          <a:noFill/>
+        </p:spPr>
+        <p:txBody>
+          <a:bodyPr wrap="square" rtlCol="1">
+            <a:spAutoFit/>
+          </a:bodyPr>
+          <a:lstStyle/>
+          <a:p>
+            <a:r>
+              <a:rPr lang="en-US" sz="2000" dirty="0">
+                <a:solidFill>
+                  <a:schemeClr val="bg1"/>
+                </a:solidFill>
+                <a:latin typeface="New Athletic M54" panose="02000500000000000000" pitchFamily="2" charset="0"/>
+              </a:rPr>
+              <a:t>If you collect a PIGGY, you will get the number of coins it contains.</a:t>
+            </a:r>
+            <a:endParaRPr lang="he-IL" sz="2000" dirty="0">
+              <a:solidFill>
+                <a:schemeClr val="bg1"/>
+              </a:solidFill>
+              <a:latin typeface="New Athletic M54" panose="02000500000000000000" pitchFamily="2" charset="0"/>
+            </a:endParaRPr>
+          </a:p>
+        </p:txBody>
+      </p:sp>
+      <p:pic>
+        <p:nvPicPr>
+          <p:cNvPr id="20" name="תמונה 19" descr="תמונה שמכילה סמל, לוגו, גרפיקה, כחול חשמלי&#10;&#10;התיאור נוצר באופן אוטומטי">
+            <a:extLst>
+              <a:ext uri="{FF2B5EF4-FFF2-40B4-BE49-F238E27FC236}">
+                <a16:creationId xmlns:a16="http://schemas.microsoft.com/office/drawing/2014/main" id="{608DF98F-A734-09EB-F710-3334BC1AD981}"/>
+              </a:ext>
+            </a:extLst>
+          </p:cNvPr>
+          <p:cNvPicPr>
+            <a:picLocks noChangeAspect="1"/>
+          </p:cNvPicPr>
+          <p:nvPr/>
+        </p:nvPicPr>
+        <p:blipFill>
+          <a:blip r:embed="rId5">
+            <a:extLst>
+              <a:ext uri="{28A0092B-C50C-407E-A947-70E740481C1C}">
+                <a14:useLocalDpi xmlns:a14="http://schemas.microsoft.com/office/drawing/2010/main" val="0"/>
+              </a:ext>
+            </a:extLst>
+          </a:blip>
+          <a:stretch>
+            <a:fillRect/>
+          </a:stretch>
+        </p:blipFill>
+        <p:spPr>
+          <a:xfrm>
+            <a:off x="805705" y="4541086"/>
+            <a:ext cx="762000" cy="571500"/>
+          </a:xfrm>
+          <a:prstGeom prst="rect">
+            <a:avLst/>
+          </a:prstGeom>
+        </p:spPr>
+      </p:pic>
+      <p:sp>
+        <p:nvSpPr>
+          <p:cNvPr id="21" name="תיבת טקסט 20">
+            <a:extLst>
+              <a:ext uri="{FF2B5EF4-FFF2-40B4-BE49-F238E27FC236}">
+                <a16:creationId xmlns:a16="http://schemas.microsoft.com/office/drawing/2014/main" id="{2E7539D1-6EA2-20EB-7495-20682B214882}"/>
+              </a:ext>
+            </a:extLst>
+          </p:cNvPr>
+          <p:cNvSpPr txBox="1"/>
+          <p:nvPr/>
+        </p:nvSpPr>
+        <p:spPr>
+          <a:xfrm>
+            <a:off x="1666261" y="4528161"/>
+            <a:ext cx="8663147" cy="707886"/>
+          </a:xfrm>
+          <a:prstGeom prst="rect">
+            <a:avLst/>
+          </a:prstGeom>
+          <a:noFill/>
+        </p:spPr>
+        <p:txBody>
+          <a:bodyPr wrap="square" rtlCol="1">
+            <a:spAutoFit/>
+          </a:bodyPr>
+          <a:lstStyle/>
+          <a:p>
+            <a:r>
+              <a:rPr lang="en-US" sz="2000" dirty="0">
+                <a:solidFill>
+                  <a:schemeClr val="bg1"/>
+                </a:solidFill>
+                <a:latin typeface="New Athletic M54" panose="02000500000000000000" pitchFamily="2" charset="0"/>
+              </a:rPr>
+              <a:t>If you collect the SPEEDY, GIFT you will become fast and protected for 15 seconds.</a:t>
+            </a:r>
+            <a:endParaRPr lang="he-IL" sz="2000" dirty="0">
+              <a:solidFill>
+                <a:schemeClr val="bg1"/>
+              </a:solidFill>
+              <a:latin typeface="New Athletic M54" panose="02000500000000000000" pitchFamily="2" charset="0"/>
+            </a:endParaRPr>
+          </a:p>
+        </p:txBody>
+      </p:sp>
+      <p:pic>
+        <p:nvPicPr>
+          <p:cNvPr id="23" name="תמונה 22" descr="תמונה שמכילה סרט מצויר, צילום מסך, אומנות&#10;&#10;התיאור נוצר באופן אוטומטי">
+            <a:extLst>
+              <a:ext uri="{FF2B5EF4-FFF2-40B4-BE49-F238E27FC236}">
+                <a16:creationId xmlns:a16="http://schemas.microsoft.com/office/drawing/2014/main" id="{AAF74EE3-29EC-DDC0-68BC-91FA462214D1}"/>
+              </a:ext>
+            </a:extLst>
+          </p:cNvPr>
+          <p:cNvPicPr>
+            <a:picLocks noChangeAspect="1"/>
+          </p:cNvPicPr>
+          <p:nvPr/>
+        </p:nvPicPr>
+        <p:blipFill rotWithShape="1">
+          <a:blip r:embed="rId6">
+            <a:extLst>
+              <a:ext uri="{28A0092B-C50C-407E-A947-70E740481C1C}">
+                <a14:useLocalDpi xmlns:a14="http://schemas.microsoft.com/office/drawing/2010/main" val="0"/>
+              </a:ext>
+            </a:extLst>
+          </a:blip>
+          <a:srcRect t="7445" r="55234" b="8366"/>
+          <a:stretch/>
+        </p:blipFill>
+        <p:spPr>
+          <a:xfrm>
+            <a:off x="3972645" y="1822005"/>
+            <a:ext cx="570904" cy="456528"/>
+          </a:xfrm>
+          <a:prstGeom prst="rect">
+            <a:avLst/>
+          </a:prstGeom>
+        </p:spPr>
+      </p:pic>
+      <p:pic>
+        <p:nvPicPr>
+          <p:cNvPr id="28" name="תמונה 27" descr="תמונה שמכילה סרט מצויר, דמות בדיונית, אנימציה, דמויות אקשן&#10;&#10;התיאור נוצר באופן אוטומטי">
+            <a:extLst>
+              <a:ext uri="{FF2B5EF4-FFF2-40B4-BE49-F238E27FC236}">
+                <a16:creationId xmlns:a16="http://schemas.microsoft.com/office/drawing/2014/main" id="{2AAFFEE7-D7E6-2671-9A04-FF310FBF2F7B}"/>
+              </a:ext>
+            </a:extLst>
+          </p:cNvPr>
+          <p:cNvPicPr>
+            <a:picLocks noChangeAspect="1"/>
+          </p:cNvPicPr>
+          <p:nvPr/>
+        </p:nvPicPr>
+        <p:blipFill rotWithShape="1">
+          <a:blip r:embed="rId7">
+            <a:extLst>
+              <a:ext uri="{28A0092B-C50C-407E-A947-70E740481C1C}">
+                <a14:useLocalDpi xmlns:a14="http://schemas.microsoft.com/office/drawing/2010/main" val="0"/>
+              </a:ext>
+            </a:extLst>
+          </a:blip>
+          <a:srcRect r="73147"/>
+          <a:stretch/>
+        </p:blipFill>
+        <p:spPr>
+          <a:xfrm>
+            <a:off x="10034492" y="1382221"/>
+            <a:ext cx="479658" cy="609627"/>
+          </a:xfrm>
+          <a:prstGeom prst="rect">
+            <a:avLst/>
+          </a:prstGeom>
+        </p:spPr>
+      </p:pic>
+      <p:pic>
+        <p:nvPicPr>
+          <p:cNvPr id="35" name="תמונה 34" descr="תמונה שמכילה צעצוע, אנימציה, דמות בדיונית, סרטים מצוירים&#10;&#10;התיאור נוצר באופן אוטומטי">
+            <a:extLst>
+              <a:ext uri="{FF2B5EF4-FFF2-40B4-BE49-F238E27FC236}">
+                <a16:creationId xmlns:a16="http://schemas.microsoft.com/office/drawing/2014/main" id="{230A2DE8-C89D-82C1-7F33-716884A979EA}"/>
+              </a:ext>
+            </a:extLst>
+          </p:cNvPr>
+          <p:cNvPicPr>
+            <a:picLocks noChangeAspect="1"/>
+          </p:cNvPicPr>
+          <p:nvPr/>
+        </p:nvPicPr>
+        <p:blipFill>
+          <a:blip r:embed="rId8">
+            <a:extLst>
+              <a:ext uri="{28A0092B-C50C-407E-A947-70E740481C1C}">
+                <a14:useLocalDpi xmlns:a14="http://schemas.microsoft.com/office/drawing/2010/main" val="0"/>
+              </a:ext>
+            </a:extLst>
+          </a:blip>
+          <a:stretch>
+            <a:fillRect/>
+          </a:stretch>
+        </p:blipFill>
+        <p:spPr>
+          <a:xfrm>
+            <a:off x="7433613" y="4328401"/>
+            <a:ext cx="2895795" cy="2895795"/>
+          </a:xfrm>
+          <a:prstGeom prst="rect">
+            <a:avLst/>
+          </a:prstGeom>
+        </p:spPr>
+      </p:pic>
     </p:spTree>
     <p:extLst>
       <p:ext uri="{BB962C8B-B14F-4D97-AF65-F5344CB8AC3E}">
-        <p14:creationId xmlns:p14="http://schemas.microsoft.com/office/powerpoint/2010/main" val="1509150701"/>
+        <p14:creationId xmlns:p14="http://schemas.microsoft.com/office/powerpoint/2010/main" val="2966858949"/>
       </p:ext>
     </p:extLst>
   </p:cSld>
@@ -3587,12 +3774,59 @@
           <a:chExt cx="0" cy="0"/>
         </a:xfrm>
       </p:grpSpPr>
+      <p:sp>
+        <p:nvSpPr>
+          <p:cNvPr id="4" name="כותרת 1">
+            <a:extLst>
+              <a:ext uri="{FF2B5EF4-FFF2-40B4-BE49-F238E27FC236}">
+                <a16:creationId xmlns:a16="http://schemas.microsoft.com/office/drawing/2014/main" id="{A84785AD-353F-EB39-EE7A-CA59980C2DE5}"/>
+              </a:ext>
+            </a:extLst>
+          </p:cNvPr>
+          <p:cNvSpPr>
+            <a:spLocks noGrp="1"/>
+          </p:cNvSpPr>
+          <p:nvPr>
+            <p:ph type="title"/>
+          </p:nvPr>
+        </p:nvSpPr>
+        <p:spPr>
+          <a:xfrm>
+            <a:off x="785813" y="452439"/>
+            <a:ext cx="9858375" cy="1211262"/>
+          </a:xfrm>
+        </p:spPr>
+        <p:txBody>
+          <a:bodyPr>
+            <a:normAutofit/>
+          </a:bodyPr>
+          <a:lstStyle/>
+          <a:p>
+            <a:pPr algn="ctr"/>
+            <a:r>
+              <a:rPr lang="en-US" sz="4000" dirty="0">
+                <a:solidFill>
+                  <a:schemeClr val="bg1"/>
+                </a:solidFill>
+                <a:latin typeface="New Athletic M54" panose="02000500000000000000" pitchFamily="2" charset="0"/>
+              </a:rPr>
+              <a:t>elements</a:t>
+            </a:r>
+            <a:endParaRPr lang="he-IL" sz="4000" dirty="0">
+              <a:solidFill>
+                <a:schemeClr val="bg1"/>
+              </a:solidFill>
+              <a:latin typeface="New Athletic M54" panose="02000500000000000000" pitchFamily="2" charset="0"/>
+            </a:endParaRPr>
+          </a:p>
+        </p:txBody>
+      </p:sp>
       <p:pic>
         <p:nvPicPr>
-          <p:cNvPr id="5" name="תמונה 4" descr="תמונה שמכילה בניין, כחול, חלון, חורף&#10;&#10;התיאור נוצר באופן אוטומטי">
+          <p:cNvPr id="5" name="תמונה 4" descr="תמונה שמכילה צעצוע, אנימציה, דמות בדיונית, סרטים מצוירים&#10;&#10;התיאור נוצר באופן אוטומטי">
             <a:extLst>
               <a:ext uri="{FF2B5EF4-FFF2-40B4-BE49-F238E27FC236}">
-                <a16:creationId xmlns:a16="http://schemas.microsoft.com/office/drawing/2014/main" id="{7DFE2DBD-8E2D-9D31-3665-871BACA85ADB}"/>
+                <a16:creationId xmlns:a16="http://schemas.microsoft.com/office/drawing/2014/main" id="{8EEF7034-ED75-7F50-33BA-9C444A0C1A48}"/>
               </a:ext>
             </a:extLst>
           </p:cNvPr>
@@ -3615,20 +3849,90 @@
         </p:blipFill>
         <p:spPr>
           <a:xfrm>
-            <a:off x="0" y="0"/>
-            <a:ext cx="11430000" cy="7534275"/>
+            <a:off x="7433613" y="4328401"/>
+            <a:ext cx="2895795" cy="2895795"/>
           </a:xfrm>
           <a:prstGeom prst="rect">
             <a:avLst/>
           </a:prstGeom>
         </p:spPr>
       </p:pic>
-      <p:sp>
-        <p:nvSpPr>
-          <p:cNvPr id="6" name="תיבת טקסט 5">
+      <p:pic>
+        <p:nvPicPr>
+          <p:cNvPr id="9" name="תמונה 8">
             <a:extLst>
               <a:ext uri="{FF2B5EF4-FFF2-40B4-BE49-F238E27FC236}">
-                <a16:creationId xmlns:a16="http://schemas.microsoft.com/office/drawing/2014/main" id="{573861F5-474C-075D-F6CF-C5F7243B2F2E}"/>
+                <a16:creationId xmlns:a16="http://schemas.microsoft.com/office/drawing/2014/main" id="{7CFE39BB-4EB8-2EB6-C104-BC0602FEEC4C}"/>
+              </a:ext>
+            </a:extLst>
+          </p:cNvPr>
+          <p:cNvPicPr>
+            <a:picLocks noChangeAspect="1"/>
+          </p:cNvPicPr>
+          <p:nvPr/>
+        </p:nvPicPr>
+        <p:blipFill rotWithShape="1">
+          <a:blip r:embed="rId3">
+            <a:extLst>
+              <a:ext uri="{28A0092B-C50C-407E-A947-70E740481C1C}">
+                <a14:useLocalDpi xmlns:a14="http://schemas.microsoft.com/office/drawing/2010/main" val="0"/>
+              </a:ext>
+            </a:extLst>
+          </a:blip>
+          <a:srcRect t="1" r="85814" b="7546"/>
+          <a:stretch/>
+        </p:blipFill>
+        <p:spPr>
+          <a:xfrm>
+            <a:off x="719853" y="1653631"/>
+            <a:ext cx="1334700" cy="795294"/>
+          </a:xfrm>
+          <a:prstGeom prst="rect">
+            <a:avLst/>
+          </a:prstGeom>
+        </p:spPr>
+      </p:pic>
+      <p:pic>
+        <p:nvPicPr>
+          <p:cNvPr id="11" name="תמונה 10" descr="תמונה שמכילה סימטריה, בורג&#10;&#10;התיאור נוצר באופן אוטומטי">
+            <a:extLst>
+              <a:ext uri="{FF2B5EF4-FFF2-40B4-BE49-F238E27FC236}">
+                <a16:creationId xmlns:a16="http://schemas.microsoft.com/office/drawing/2014/main" id="{1A9AB8CA-11A7-8F59-BF20-86396124B784}"/>
+              </a:ext>
+            </a:extLst>
+          </p:cNvPr>
+          <p:cNvPicPr>
+            <a:picLocks noChangeAspect="1"/>
+          </p:cNvPicPr>
+          <p:nvPr/>
+        </p:nvPicPr>
+        <p:blipFill rotWithShape="1">
+          <a:blip r:embed="rId4">
+            <a:extLst>
+              <a:ext uri="{28A0092B-C50C-407E-A947-70E740481C1C}">
+                <a14:useLocalDpi xmlns:a14="http://schemas.microsoft.com/office/drawing/2010/main" val="0"/>
+              </a:ext>
+            </a:extLst>
+          </a:blip>
+          <a:srcRect r="75664"/>
+          <a:stretch/>
+        </p:blipFill>
+        <p:spPr>
+          <a:xfrm rot="2035497">
+            <a:off x="973286" y="3615654"/>
+            <a:ext cx="425529" cy="1800007"/>
+          </a:xfrm>
+          <a:prstGeom prst="rect">
+            <a:avLst/>
+          </a:prstGeom>
+        </p:spPr>
+      </p:pic>
+      <p:sp>
+        <p:nvSpPr>
+          <p:cNvPr id="12" name="תיבת טקסט 11">
+            <a:extLst>
+              <a:ext uri="{FF2B5EF4-FFF2-40B4-BE49-F238E27FC236}">
+                <a16:creationId xmlns:a16="http://schemas.microsoft.com/office/drawing/2014/main" id="{619EC763-4D7E-A1E5-010E-99356483A226}"/>
               </a:ext>
             </a:extLst>
           </p:cNvPr>
@@ -3637,8 +3941,8 @@
         </p:nvSpPr>
         <p:spPr>
           <a:xfrm>
-            <a:off x="558209" y="950981"/>
-            <a:ext cx="10313582" cy="5632311"/>
+            <a:off x="1980411" y="1864187"/>
+            <a:ext cx="8663777" cy="707886"/>
           </a:xfrm>
           <a:prstGeom prst="rect">
             <a:avLst/>
@@ -3651,205 +3955,155 @@
           </a:bodyPr>
           <a:lstStyle/>
           <a:p>
-            <a:pPr algn="just"/>
-            <a:r>
-              <a:rPr lang="en-US" sz="2000" i="0" dirty="0">
-                <a:solidFill>
-                  <a:srgbClr val="FFFFFF"/>
-                </a:solidFill>
-                <a:effectLst/>
-                <a:latin typeface="ADLaM Display" panose="020F0502020204030204" pitchFamily="2" charset="0"/>
-                <a:ea typeface="ADLaM Display" panose="020F0502020204030204" pitchFamily="2" charset="0"/>
-                <a:cs typeface="ADLaM Display" panose="020F0502020204030204" pitchFamily="2" charset="0"/>
-              </a:rPr>
-              <a:t>Jetpack Joyride is an endless runner where you fly a jetpack. </a:t>
-            </a:r>
             <a:r>
               <a:rPr lang="en-US" sz="2000" dirty="0">
                 <a:solidFill>
-                  <a:srgbClr val="FFFFFF"/>
+                  <a:schemeClr val="bg1"/>
                 </a:solidFill>
-                <a:latin typeface="ADLaM Display" panose="020F0502020204030204" pitchFamily="2" charset="0"/>
-                <a:ea typeface="ADLaM Display" panose="020F0502020204030204" pitchFamily="2" charset="0"/>
-                <a:cs typeface="ADLaM Display" panose="020F0502020204030204" pitchFamily="2" charset="0"/>
+                <a:latin typeface="New Athletic M54" panose="02000500000000000000" pitchFamily="2" charset="0"/>
               </a:rPr>
-              <a:t>Collect Coins</a:t>
-            </a:r>
-            <a:r>
-              <a:rPr lang="en-US" sz="2000" i="0" dirty="0">
+              <a:t>The missile is a guided missile, you must dodge it. If the player is hit, he will die.</a:t>
+            </a:r>
+            <a:endParaRPr lang="he-IL" sz="2000" dirty="0">
+              <a:solidFill>
+                <a:schemeClr val="bg1"/>
+              </a:solidFill>
+              <a:latin typeface="New Athletic M54" panose="02000500000000000000" pitchFamily="2" charset="0"/>
+            </a:endParaRPr>
+          </a:p>
+        </p:txBody>
+      </p:sp>
+      <p:pic>
+        <p:nvPicPr>
+          <p:cNvPr id="14" name="תמונה 13" descr="תמונה שמכילה פיקסל&#10;&#10;התיאור נוצר באופן אוטומטי">
+            <a:extLst>
+              <a:ext uri="{FF2B5EF4-FFF2-40B4-BE49-F238E27FC236}">
+                <a16:creationId xmlns:a16="http://schemas.microsoft.com/office/drawing/2014/main" id="{39EA2F08-76A3-C1EB-E793-2B29D3622EFE}"/>
+              </a:ext>
+            </a:extLst>
+          </p:cNvPr>
+          <p:cNvPicPr>
+            <a:picLocks noChangeAspect="1"/>
+          </p:cNvPicPr>
+          <p:nvPr/>
+        </p:nvPicPr>
+        <p:blipFill rotWithShape="1">
+          <a:blip r:embed="rId5">
+            <a:extLst>
+              <a:ext uri="{28A0092B-C50C-407E-A947-70E740481C1C}">
+                <a14:useLocalDpi xmlns:a14="http://schemas.microsoft.com/office/drawing/2010/main" val="0"/>
+              </a:ext>
+            </a:extLst>
+          </a:blip>
+          <a:srcRect l="50000" t="1" b="-8918"/>
+          <a:stretch/>
+        </p:blipFill>
+        <p:spPr>
+          <a:xfrm>
+            <a:off x="953640" y="2729557"/>
+            <a:ext cx="952633" cy="1037580"/>
+          </a:xfrm>
+          <a:prstGeom prst="rect">
+            <a:avLst/>
+          </a:prstGeom>
+        </p:spPr>
+      </p:pic>
+      <p:sp>
+        <p:nvSpPr>
+          <p:cNvPr id="15" name="תיבת טקסט 14">
+            <a:extLst>
+              <a:ext uri="{FF2B5EF4-FFF2-40B4-BE49-F238E27FC236}">
+                <a16:creationId xmlns:a16="http://schemas.microsoft.com/office/drawing/2014/main" id="{F8BE67DA-57D4-781A-BA77-24F8AA09388D}"/>
+              </a:ext>
+            </a:extLst>
+          </p:cNvPr>
+          <p:cNvSpPr txBox="1"/>
+          <p:nvPr/>
+        </p:nvSpPr>
+        <p:spPr>
+          <a:xfrm>
+            <a:off x="1980411" y="2894404"/>
+            <a:ext cx="8663777" cy="707886"/>
+          </a:xfrm>
+          <a:prstGeom prst="rect">
+            <a:avLst/>
+          </a:prstGeom>
+          <a:noFill/>
+        </p:spPr>
+        <p:txBody>
+          <a:bodyPr wrap="square" rtlCol="1">
+            <a:spAutoFit/>
+          </a:bodyPr>
+          <a:lstStyle/>
+          <a:p>
+            <a:r>
+              <a:rPr lang="en-US" sz="2000" dirty="0">
                 <a:solidFill>
-                  <a:srgbClr val="FFFFFF"/>
+                  <a:schemeClr val="bg1"/>
                 </a:solidFill>
-                <a:effectLst/>
-                <a:latin typeface="ADLaM Display" panose="020F0502020204030204" pitchFamily="2" charset="0"/>
-                <a:ea typeface="ADLaM Display" panose="020F0502020204030204" pitchFamily="2" charset="0"/>
-                <a:cs typeface="ADLaM Display" panose="020F0502020204030204" pitchFamily="2" charset="0"/>
+                <a:latin typeface="New Athletic M54" panose="02000500000000000000" pitchFamily="2" charset="0"/>
               </a:rPr>
-              <a:t> and avoid deadly obstacles. Keep going for as long as you can, and pick up power-ups along the way!</a:t>
-            </a:r>
-          </a:p>
-          <a:p>
-            <a:pPr algn="just"/>
-            <a:r>
-              <a:rPr lang="en-US" sz="2000" i="0" dirty="0">
+              <a:t>Before the missile is launched, an alert will appear and indicating the location from which the missile will arrive.</a:t>
+            </a:r>
+            <a:endParaRPr lang="he-IL" sz="2000" dirty="0">
+              <a:solidFill>
+                <a:schemeClr val="bg1"/>
+              </a:solidFill>
+              <a:latin typeface="New Athletic M54" panose="02000500000000000000" pitchFamily="2" charset="0"/>
+            </a:endParaRPr>
+          </a:p>
+        </p:txBody>
+      </p:sp>
+      <p:sp>
+        <p:nvSpPr>
+          <p:cNvPr id="16" name="תיבת טקסט 15">
+            <a:extLst>
+              <a:ext uri="{FF2B5EF4-FFF2-40B4-BE49-F238E27FC236}">
+                <a16:creationId xmlns:a16="http://schemas.microsoft.com/office/drawing/2014/main" id="{F0B18402-B262-D7D0-41C9-08FFF673C138}"/>
+              </a:ext>
+            </a:extLst>
+          </p:cNvPr>
+          <p:cNvSpPr txBox="1"/>
+          <p:nvPr/>
+        </p:nvSpPr>
+        <p:spPr>
+          <a:xfrm>
+            <a:off x="1980411" y="4161714"/>
+            <a:ext cx="8348997" cy="707886"/>
+          </a:xfrm>
+          <a:prstGeom prst="rect">
+            <a:avLst/>
+          </a:prstGeom>
+          <a:noFill/>
+        </p:spPr>
+        <p:txBody>
+          <a:bodyPr wrap="square" rtlCol="1">
+            <a:spAutoFit/>
+          </a:bodyPr>
+          <a:lstStyle/>
+          <a:p>
+            <a:r>
+              <a:rPr lang="en-US" sz="2000" dirty="0">
                 <a:solidFill>
-                  <a:srgbClr val="FFFFFF"/>
+                  <a:schemeClr val="bg1"/>
                 </a:solidFill>
-                <a:effectLst/>
-                <a:latin typeface="ADLaM Display" panose="020F0502020204030204" pitchFamily="2" charset="0"/>
-                <a:ea typeface="ADLaM Display" panose="020F0502020204030204" pitchFamily="2" charset="0"/>
-                <a:cs typeface="ADLaM Display" panose="020F0502020204030204" pitchFamily="2" charset="0"/>
+                <a:latin typeface="New Athletic M54" panose="02000500000000000000" pitchFamily="2" charset="0"/>
               </a:rPr>
-              <a:t>Features</a:t>
-            </a:r>
-          </a:p>
-          <a:p>
-            <a:pPr algn="just"/>
-            <a:r>
-              <a:rPr lang="en-US" sz="2000" i="0" dirty="0">
-                <a:solidFill>
-                  <a:srgbClr val="FFFFFF"/>
-                </a:solidFill>
-                <a:effectLst/>
-                <a:latin typeface="ADLaM Display" panose="020F0502020204030204" pitchFamily="2" charset="0"/>
-                <a:ea typeface="ADLaM Display" panose="020F0502020204030204" pitchFamily="2" charset="0"/>
-                <a:cs typeface="ADLaM Display" panose="020F0502020204030204" pitchFamily="2" charset="0"/>
-              </a:rPr>
-              <a:t>Run, dodge, and collect</a:t>
-            </a:r>
-          </a:p>
-          <a:p>
-            <a:pPr algn="just"/>
-            <a:r>
-              <a:rPr lang="en-US" sz="2000" i="0" dirty="0">
-                <a:solidFill>
-                  <a:srgbClr val="FFFFFF"/>
-                </a:solidFill>
-                <a:effectLst/>
-                <a:latin typeface="ADLaM Display" panose="020F0502020204030204" pitchFamily="2" charset="0"/>
-                <a:ea typeface="ADLaM Display" panose="020F0502020204030204" pitchFamily="2" charset="0"/>
-                <a:cs typeface="ADLaM Display" panose="020F0502020204030204" pitchFamily="2" charset="0"/>
-              </a:rPr>
-              <a:t>Run endlessly avoiding homing missiles and lasers. Pick up as many coins as you can and travel the furthest distance possible without dying.</a:t>
-            </a:r>
-          </a:p>
-          <a:p>
-            <a:pPr algn="just"/>
-            <a:r>
-              <a:rPr lang="en-US" sz="2000" i="0" dirty="0">
-                <a:solidFill>
-                  <a:srgbClr val="FFFFFF"/>
-                </a:solidFill>
-                <a:effectLst/>
-                <a:latin typeface="ADLaM Display" panose="020F0502020204030204" pitchFamily="2" charset="0"/>
-                <a:ea typeface="ADLaM Display" panose="020F0502020204030204" pitchFamily="2" charset="0"/>
-                <a:cs typeface="ADLaM Display" panose="020F0502020204030204" pitchFamily="2" charset="0"/>
-              </a:rPr>
-              <a:t>Buy upgrades to improve survivability</a:t>
-            </a:r>
-          </a:p>
-          <a:p>
-            <a:pPr algn="just"/>
-            <a:r>
-              <a:rPr lang="en-US" sz="2000" i="0" dirty="0">
-                <a:solidFill>
-                  <a:srgbClr val="FFFFFF"/>
-                </a:solidFill>
-                <a:effectLst/>
-                <a:latin typeface="ADLaM Display" panose="020F0502020204030204" pitchFamily="2" charset="0"/>
-                <a:ea typeface="ADLaM Display" panose="020F0502020204030204" pitchFamily="2" charset="0"/>
-                <a:cs typeface="ADLaM Display" panose="020F0502020204030204" pitchFamily="2" charset="0"/>
-              </a:rPr>
-              <a:t>Use your coins to buy upgrades like little stomper, rocket boost, armor, and a gravity suit. Each upgrade item gives you an extra layer of protection and a unique ability.</a:t>
-            </a:r>
-          </a:p>
-          <a:p>
-            <a:pPr algn="just"/>
-            <a:r>
-              <a:rPr lang="en-US" sz="2000" i="0" dirty="0">
-                <a:solidFill>
-                  <a:srgbClr val="FFFFFF"/>
-                </a:solidFill>
-                <a:effectLst/>
-                <a:latin typeface="ADLaM Display" panose="020F0502020204030204" pitchFamily="2" charset="0"/>
-                <a:ea typeface="ADLaM Display" panose="020F0502020204030204" pitchFamily="2" charset="0"/>
-                <a:cs typeface="ADLaM Display" panose="020F0502020204030204" pitchFamily="2" charset="0"/>
-              </a:rPr>
-              <a:t>Power-up your rocket man</a:t>
-            </a:r>
-          </a:p>
-          <a:p>
-            <a:pPr algn="just"/>
-            <a:r>
-              <a:rPr lang="en-US" sz="2000" i="0" dirty="0">
-                <a:solidFill>
-                  <a:srgbClr val="FFFFFF"/>
-                </a:solidFill>
-                <a:effectLst/>
-                <a:latin typeface="ADLaM Display" panose="020F0502020204030204" pitchFamily="2" charset="0"/>
-                <a:ea typeface="ADLaM Display" panose="020F0502020204030204" pitchFamily="2" charset="0"/>
-                <a:cs typeface="ADLaM Display" panose="020F0502020204030204" pitchFamily="2" charset="0"/>
-              </a:rPr>
-              <a:t>As you get further you'll find power-ups like extra speed and a piggy bank that spills coins everywhere. You can also find upgrade items throughout the map as well as at the beginning.</a:t>
-            </a:r>
-          </a:p>
-          <a:p>
-            <a:pPr algn="just"/>
-            <a:r>
-              <a:rPr lang="en-US" sz="2000" i="0" dirty="0">
-                <a:solidFill>
-                  <a:srgbClr val="FFFFFF"/>
-                </a:solidFill>
-                <a:effectLst/>
-                <a:latin typeface="ADLaM Display" panose="020F0502020204030204" pitchFamily="2" charset="0"/>
-                <a:ea typeface="ADLaM Display" panose="020F0502020204030204" pitchFamily="2" charset="0"/>
-                <a:cs typeface="ADLaM Display" panose="020F0502020204030204" pitchFamily="2" charset="0"/>
-              </a:rPr>
-              <a:t>Game Tips</a:t>
-            </a:r>
-          </a:p>
-          <a:p>
-            <a:pPr algn="just">
-              <a:buFont typeface="Arial" panose="020B0604020202020204" pitchFamily="34" charset="0"/>
-              <a:buChar char="•"/>
-            </a:pPr>
-            <a:r>
-              <a:rPr lang="en-US" sz="2000" i="0" dirty="0">
-                <a:solidFill>
-                  <a:srgbClr val="FFFFFF"/>
-                </a:solidFill>
-                <a:effectLst/>
-                <a:latin typeface="ADLaM Display" panose="020F0502020204030204" pitchFamily="2" charset="0"/>
-                <a:ea typeface="ADLaM Display" panose="020F0502020204030204" pitchFamily="2" charset="0"/>
-                <a:cs typeface="ADLaM Display" panose="020F0502020204030204" pitchFamily="2" charset="0"/>
-              </a:rPr>
-              <a:t>Wait for the missiles to lock on before moving</a:t>
-            </a:r>
-          </a:p>
-          <a:p>
-            <a:pPr algn="just">
-              <a:buFont typeface="Arial" panose="020B0604020202020204" pitchFamily="34" charset="0"/>
-              <a:buChar char="•"/>
-            </a:pPr>
-            <a:r>
-              <a:rPr lang="en-US" sz="2000" i="0" dirty="0">
-                <a:solidFill>
-                  <a:srgbClr val="FFFFFF"/>
-                </a:solidFill>
-                <a:effectLst/>
-                <a:latin typeface="ADLaM Display" panose="020F0502020204030204" pitchFamily="2" charset="0"/>
-                <a:ea typeface="ADLaM Display" panose="020F0502020204030204" pitchFamily="2" charset="0"/>
-                <a:cs typeface="ADLaM Display" panose="020F0502020204030204" pitchFamily="2" charset="0"/>
-              </a:rPr>
-              <a:t>The ceiling and floor are the safest places to run</a:t>
-            </a:r>
+              <a:t>If the player collides with the laser, the player will be electrocuted and die.</a:t>
+            </a:r>
+            <a:endParaRPr lang="he-IL" sz="2000" dirty="0">
+              <a:solidFill>
+                <a:schemeClr val="bg1"/>
+              </a:solidFill>
+              <a:latin typeface="New Athletic M54" panose="02000500000000000000" pitchFamily="2" charset="0"/>
+            </a:endParaRPr>
           </a:p>
         </p:txBody>
       </p:sp>
     </p:spTree>
     <p:extLst>
       <p:ext uri="{BB962C8B-B14F-4D97-AF65-F5344CB8AC3E}">
-        <p14:creationId xmlns:p14="http://schemas.microsoft.com/office/powerpoint/2010/main" val="3651013708"/>
+        <p14:creationId xmlns:p14="http://schemas.microsoft.com/office/powerpoint/2010/main" val="3780454008"/>
       </p:ext>
     </p:extLst>
   </p:cSld>

</xml_diff>